<commit_message>
update for unit 5
</commit_message>
<xml_diff>
--- a/lectures/Lect05_Lasso.pptx
+++ b/lectures/Lect05_Lasso.pptx
@@ -5,7 +5,7 @@
     <p:sldMasterId id="2147483648" r:id="rId1"/>
   </p:sldMasterIdLst>
   <p:notesMasterIdLst>
-    <p:notesMasterId r:id="rId48"/>
+    <p:notesMasterId r:id="rId50"/>
   </p:notesMasterIdLst>
   <p:sldIdLst>
     <p:sldId id="258" r:id="rId2"/>
@@ -54,6 +54,8 @@
     <p:sldId id="417" r:id="rId45"/>
     <p:sldId id="418" r:id="rId46"/>
     <p:sldId id="412" r:id="rId47"/>
+    <p:sldId id="422" r:id="rId48"/>
+    <p:sldId id="423" r:id="rId49"/>
   </p:sldIdLst>
   <p:sldSz cx="12192000" cy="6858000"/>
   <p:notesSz cx="7010400" cy="9296400"/>
@@ -281,7 +283,7 @@
           <a:p>
             <a:fld id="{B7D6DDD3-D7E9-488B-B626-1E8285E424D8}" type="datetimeFigureOut">
               <a:rPr lang="en-US" smtClean="0"/>
-              <a:t>9/25/2019</a:t>
+              <a:t>9/26/2019</a:t>
             </a:fld>
             <a:endParaRPr lang="en-US"/>
           </a:p>
@@ -1721,6 +1723,90 @@
     <p:extLst>
       <p:ext uri="{BB962C8B-B14F-4D97-AF65-F5344CB8AC3E}">
         <p14:creationId xmlns:p14="http://schemas.microsoft.com/office/powerpoint/2010/main" val="2300309700"/>
+      </p:ext>
+    </p:extLst>
+  </p:cSld>
+  <p:clrMapOvr>
+    <a:masterClrMapping/>
+  </p:clrMapOvr>
+</p:notes>
+</file>
+
+<file path=ppt/notesSlides/notesSlide21.xml><?xml version="1.0" encoding="utf-8"?>
+<p:notes xmlns:a="http://schemas.openxmlformats.org/drawingml/2006/main" xmlns:r="http://schemas.openxmlformats.org/officeDocument/2006/relationships" xmlns:p="http://schemas.openxmlformats.org/presentationml/2006/main">
+  <p:cSld>
+    <p:spTree>
+      <p:nvGrpSpPr>
+        <p:cNvPr id="1" name=""/>
+        <p:cNvGrpSpPr/>
+        <p:nvPr/>
+      </p:nvGrpSpPr>
+      <p:grpSpPr>
+        <a:xfrm>
+          <a:off x="0" y="0"/>
+          <a:ext cx="0" cy="0"/>
+          <a:chOff x="0" y="0"/>
+          <a:chExt cx="0" cy="0"/>
+        </a:xfrm>
+      </p:grpSpPr>
+      <p:sp>
+        <p:nvSpPr>
+          <p:cNvPr id="2" name="Slide Image Placeholder 1"/>
+          <p:cNvSpPr>
+            <a:spLocks noGrp="1" noRot="1" noChangeAspect="1"/>
+          </p:cNvSpPr>
+          <p:nvPr>
+            <p:ph type="sldImg"/>
+          </p:nvPr>
+        </p:nvSpPr>
+        <p:spPr/>
+      </p:sp>
+      <p:sp>
+        <p:nvSpPr>
+          <p:cNvPr id="3" name="Notes Placeholder 2"/>
+          <p:cNvSpPr>
+            <a:spLocks noGrp="1"/>
+          </p:cNvSpPr>
+          <p:nvPr>
+            <p:ph type="body" idx="1"/>
+          </p:nvPr>
+        </p:nvSpPr>
+        <p:spPr/>
+        <p:txBody>
+          <a:bodyPr/>
+          <a:lstStyle/>
+          <a:p>
+            <a:endParaRPr lang="en-US"/>
+          </a:p>
+        </p:txBody>
+      </p:sp>
+      <p:sp>
+        <p:nvSpPr>
+          <p:cNvPr id="4" name="Slide Number Placeholder 3"/>
+          <p:cNvSpPr>
+            <a:spLocks noGrp="1"/>
+          </p:cNvSpPr>
+          <p:nvPr>
+            <p:ph type="sldNum" sz="quarter" idx="10"/>
+          </p:nvPr>
+        </p:nvSpPr>
+        <p:spPr/>
+        <p:txBody>
+          <a:bodyPr/>
+          <a:lstStyle/>
+          <a:p>
+            <a:fld id="{65CF6084-2C3C-4FE7-B181-D16A3429058A}" type="slidenum">
+              <a:rPr lang="en-US" smtClean="0"/>
+              <a:t>47</a:t>
+            </a:fld>
+            <a:endParaRPr lang="en-US"/>
+          </a:p>
+        </p:txBody>
+      </p:sp>
+    </p:spTree>
+    <p:extLst>
+      <p:ext uri="{BB962C8B-B14F-4D97-AF65-F5344CB8AC3E}">
+        <p14:creationId xmlns:p14="http://schemas.microsoft.com/office/powerpoint/2010/main" val="2235598463"/>
       </p:ext>
     </p:extLst>
   </p:cSld>
@@ -6022,8 +6108,8 @@
           </a:p>
         </p:txBody>
       </p:sp>
-      <mc:AlternateContent xmlns:mc="http://schemas.openxmlformats.org/markup-compatibility/2006">
-        <mc:Choice xmlns:a14="http://schemas.microsoft.com/office/drawing/2010/main" Requires="a14">
+      <mc:AlternateContent xmlns:mc="http://schemas.openxmlformats.org/markup-compatibility/2006" xmlns:a14="http://schemas.microsoft.com/office/drawing/2010/main">
+        <mc:Choice Requires="a14">
           <p:sp>
             <p:nvSpPr>
               <p:cNvPr id="3" name="Content Placeholder 2">
@@ -6700,7 +6786,7 @@
             </p:txBody>
           </p:sp>
         </mc:Choice>
-        <mc:Fallback>
+        <mc:Fallback xmlns="">
           <p:sp>
             <p:nvSpPr>
               <p:cNvPr id="3" name="Content Placeholder 2">
@@ -7471,8 +7557,8 @@
           </a:p>
         </p:txBody>
       </p:sp>
-      <mc:AlternateContent xmlns:mc="http://schemas.openxmlformats.org/markup-compatibility/2006">
-        <mc:Choice xmlns:a14="http://schemas.microsoft.com/office/drawing/2010/main" Requires="a14">
+      <mc:AlternateContent xmlns:mc="http://schemas.openxmlformats.org/markup-compatibility/2006" xmlns:a14="http://schemas.microsoft.com/office/drawing/2010/main">
+        <mc:Choice Requires="a14">
           <p:sp>
             <p:nvSpPr>
               <p:cNvPr id="3" name="Content Placeholder 2">
@@ -7947,7 +8033,7 @@
             </p:txBody>
           </p:sp>
         </mc:Choice>
-        <mc:Fallback>
+        <mc:Fallback xmlns="">
           <p:sp>
             <p:nvSpPr>
               <p:cNvPr id="3" name="Content Placeholder 2">
@@ -11177,8 +11263,8 @@
           </a:p>
         </p:txBody>
       </p:sp>
-      <mc:AlternateContent xmlns:mc="http://schemas.openxmlformats.org/markup-compatibility/2006">
-        <mc:Choice xmlns:a14="http://schemas.microsoft.com/office/drawing/2010/main" Requires="a14">
+      <mc:AlternateContent xmlns:mc="http://schemas.openxmlformats.org/markup-compatibility/2006" xmlns:a14="http://schemas.microsoft.com/office/drawing/2010/main">
+        <mc:Choice Requires="a14">
           <p:sp>
             <p:nvSpPr>
               <p:cNvPr id="3" name="Content Placeholder 2">
@@ -11887,7 +11973,7 @@
             </p:txBody>
           </p:sp>
         </mc:Choice>
-        <mc:Fallback>
+        <mc:Fallback xmlns="">
           <p:sp>
             <p:nvSpPr>
               <p:cNvPr id="3" name="Content Placeholder 2">
@@ -13270,8 +13356,8 @@
           </mc:Fallback>
         </mc:AlternateContent>
       </p:grpSp>
-      <mc:AlternateContent xmlns:mc="http://schemas.openxmlformats.org/markup-compatibility/2006">
-        <mc:Choice xmlns:a14="http://schemas.microsoft.com/office/drawing/2010/main" Requires="a14">
+      <mc:AlternateContent xmlns:mc="http://schemas.openxmlformats.org/markup-compatibility/2006" xmlns:a14="http://schemas.microsoft.com/office/drawing/2010/main">
+        <mc:Choice Requires="a14">
           <p:sp>
             <p:nvSpPr>
               <p:cNvPr id="9" name="TextBox 8">
@@ -13441,7 +13527,7 @@
             </p:txBody>
           </p:sp>
         </mc:Choice>
-        <mc:Fallback>
+        <mc:Fallback xmlns="">
           <p:sp>
             <p:nvSpPr>
               <p:cNvPr id="9" name="TextBox 8">
@@ -18363,8 +18449,8 @@
           </a:p>
         </p:txBody>
       </p:sp>
-      <mc:AlternateContent xmlns:mc="http://schemas.openxmlformats.org/markup-compatibility/2006">
-        <mc:Choice xmlns:a14="http://schemas.microsoft.com/office/drawing/2010/main" Requires="a14">
+      <mc:AlternateContent xmlns:mc="http://schemas.openxmlformats.org/markup-compatibility/2006" xmlns:a14="http://schemas.microsoft.com/office/drawing/2010/main">
+        <mc:Choice Requires="a14">
           <p:sp>
             <p:nvSpPr>
               <p:cNvPr id="3" name="Content Placeholder 2">
@@ -18891,7 +18977,7 @@
             </p:txBody>
           </p:sp>
         </mc:Choice>
-        <mc:Fallback>
+        <mc:Fallback xmlns="">
           <p:sp>
             <p:nvSpPr>
               <p:cNvPr id="3" name="Content Placeholder 2">
@@ -21411,8 +21497,8 @@
           </a:p>
         </p:txBody>
       </p:sp>
-      <mc:AlternateContent xmlns:mc="http://schemas.openxmlformats.org/markup-compatibility/2006">
-        <mc:Choice xmlns:a14="http://schemas.microsoft.com/office/drawing/2010/main" Requires="a14">
+      <mc:AlternateContent xmlns:mc="http://schemas.openxmlformats.org/markup-compatibility/2006" xmlns:a14="http://schemas.microsoft.com/office/drawing/2010/main">
+        <mc:Choice Requires="a14">
           <p:sp>
             <p:nvSpPr>
               <p:cNvPr id="3" name="Content Placeholder 2">
@@ -22395,7 +22481,7 @@
             </p:txBody>
           </p:sp>
         </mc:Choice>
-        <mc:Fallback>
+        <mc:Fallback xmlns="">
           <p:sp>
             <p:nvSpPr>
               <p:cNvPr id="3" name="Content Placeholder 2">
@@ -28844,6 +28930,524 @@
 </p:sld>
 </file>
 
+<file path=ppt/slides/slide47.xml><?xml version="1.0" encoding="utf-8"?>
+<p:sld xmlns:a="http://schemas.openxmlformats.org/drawingml/2006/main" xmlns:r="http://schemas.openxmlformats.org/officeDocument/2006/relationships" xmlns:p="http://schemas.openxmlformats.org/presentationml/2006/main">
+  <p:cSld>
+    <p:spTree>
+      <p:nvGrpSpPr>
+        <p:cNvPr id="1" name=""/>
+        <p:cNvGrpSpPr/>
+        <p:nvPr/>
+      </p:nvGrpSpPr>
+      <p:grpSpPr>
+        <a:xfrm>
+          <a:off x="0" y="0"/>
+          <a:ext cx="0" cy="0"/>
+          <a:chOff x="0" y="0"/>
+          <a:chExt cx="0" cy="0"/>
+        </a:xfrm>
+      </p:grpSpPr>
+      <p:sp>
+        <p:nvSpPr>
+          <p:cNvPr id="2" name="Title 1"/>
+          <p:cNvSpPr>
+            <a:spLocks noGrp="1"/>
+          </p:cNvSpPr>
+          <p:nvPr>
+            <p:ph type="title"/>
+          </p:nvPr>
+        </p:nvSpPr>
+        <p:spPr/>
+        <p:txBody>
+          <a:bodyPr/>
+          <a:lstStyle/>
+          <a:p>
+            <a:r>
+              <a:rPr lang="en-US" dirty="0"/>
+              <a:t>FAQ</a:t>
+            </a:r>
+          </a:p>
+        </p:txBody>
+      </p:sp>
+      <mc:AlternateContent xmlns:mc="http://schemas.openxmlformats.org/markup-compatibility/2006">
+        <mc:Choice xmlns:a14="http://schemas.microsoft.com/office/drawing/2010/main" Requires="a14">
+          <p:sp>
+            <p:nvSpPr>
+              <p:cNvPr id="3" name="Content Placeholder 2"/>
+              <p:cNvSpPr>
+                <a:spLocks noGrp="1"/>
+              </p:cNvSpPr>
+              <p:nvPr>
+                <p:ph idx="1"/>
+              </p:nvPr>
+            </p:nvSpPr>
+            <p:spPr/>
+            <p:txBody>
+              <a:bodyPr>
+                <a:normAutofit/>
+              </a:bodyPr>
+              <a:lstStyle/>
+              <a:p>
+                <a:r>
+                  <a:rPr lang="en-US" dirty="0"/>
+                  <a:t>Q: </a:t>
+                </a:r>
+                <a:r>
+                  <a:rPr lang="en-US" b="1" dirty="0"/>
+                  <a:t>Why do we want to keep the </a:t>
+                </a:r>
+                <a14:m>
+                  <m:oMath xmlns:m="http://schemas.openxmlformats.org/officeDocument/2006/math">
+                    <m:r>
+                      <a:rPr lang="en-US" b="1" i="1">
+                        <a:latin typeface="Cambria Math" panose="02040503050406030204" pitchFamily="18" charset="0"/>
+                      </a:rPr>
+                      <m:t> </m:t>
+                    </m:r>
+                    <m:r>
+                      <a:rPr lang="en-US" b="1" i="1">
+                        <a:latin typeface="Cambria Math" panose="02040503050406030204" pitchFamily="18" charset="0"/>
+                      </a:rPr>
+                      <m:t>𝜷</m:t>
+                    </m:r>
+                  </m:oMath>
+                </a14:m>
+                <a:r>
+                  <a:rPr lang="en-US" b="1" dirty="0"/>
+                  <a:t> small?   </a:t>
+                </a:r>
+              </a:p>
+              <a:p>
+                <a:pPr lvl="1"/>
+                <a:r>
+                  <a:rPr lang="en-US" dirty="0"/>
+                  <a:t>If the </a:t>
+                </a:r>
+                <a14:m>
+                  <m:oMath xmlns:m="http://schemas.openxmlformats.org/officeDocument/2006/math">
+                    <m:r>
+                      <a:rPr lang="en-US" i="1">
+                        <a:latin typeface="Cambria Math" panose="02040503050406030204" pitchFamily="18" charset="0"/>
+                      </a:rPr>
+                      <m:t> </m:t>
+                    </m:r>
+                    <m:r>
+                      <a:rPr lang="en-US" b="1" i="1">
+                        <a:latin typeface="Cambria Math" panose="02040503050406030204" pitchFamily="18" charset="0"/>
+                      </a:rPr>
+                      <m:t>𝜷</m:t>
+                    </m:r>
+                  </m:oMath>
+                </a14:m>
+                <a:r>
+                  <a:rPr lang="en-US" dirty="0"/>
+                  <a:t> are unconstrained, they can explode and then they are susceptible to high variance. </a:t>
+                </a:r>
+              </a:p>
+              <a:p>
+                <a:pPr lvl="1"/>
+                <a:endParaRPr lang="en-US" dirty="0"/>
+              </a:p>
+              <a:p>
+                <a:r>
+                  <a:rPr lang="en-US" dirty="0"/>
+                  <a:t>Q: </a:t>
+                </a:r>
+                <a:r>
+                  <a:rPr lang="en-US" b="1" dirty="0"/>
+                  <a:t>What are the key differences between Ridge and Lasso:</a:t>
+                </a:r>
+              </a:p>
+              <a:p>
+                <a:pPr lvl="1"/>
+                <a:r>
+                  <a:rPr lang="en-US" dirty="0"/>
+                  <a:t>Ridge (L2) includes all (or none) of the features in the model.  Therefore the major </a:t>
+                </a:r>
+                <a:r>
+                  <a:rPr lang="en-US" b="1" dirty="0"/>
+                  <a:t>advantage</a:t>
+                </a:r>
+                <a:r>
+                  <a:rPr lang="en-US" dirty="0"/>
+                  <a:t> is </a:t>
+                </a:r>
+                <a:r>
+                  <a:rPr lang="en-US" b="1" dirty="0"/>
+                  <a:t>coefficient shrinkage </a:t>
+                </a:r>
+                <a:r>
+                  <a:rPr lang="en-US" dirty="0"/>
+                  <a:t>and </a:t>
+                </a:r>
+                <a:r>
+                  <a:rPr lang="en-US" b="1" dirty="0"/>
+                  <a:t>model complexity</a:t>
+                </a:r>
+                <a:r>
+                  <a:rPr lang="en-US" dirty="0"/>
+                  <a:t>. </a:t>
+                </a:r>
+              </a:p>
+              <a:p>
+                <a:pPr lvl="1"/>
+                <a:r>
+                  <a:rPr lang="en-US" dirty="0"/>
+                  <a:t>Lasso (L1) also shrinks coefficients, but it also performs feature selection since some of the coefficients will become zero. </a:t>
+                </a:r>
+              </a:p>
+              <a:p>
+                <a:pPr lvl="1"/>
+                <a:endParaRPr lang="en-US" dirty="0"/>
+              </a:p>
+              <a:p>
+                <a:r>
+                  <a:rPr lang="en-US" dirty="0"/>
+                  <a:t>Q: </a:t>
+                </a:r>
+                <a:r>
+                  <a:rPr lang="en-US" b="1" dirty="0"/>
+                  <a:t>What are some of the typical use cases of Lasso and Ridge Regularization? </a:t>
+                </a:r>
+              </a:p>
+              <a:p>
+                <a:pPr lvl="1"/>
+                <a:r>
+                  <a:rPr lang="en-US" dirty="0"/>
+                  <a:t>Ridge:  it’s used mainly to prevent overfitting.  </a:t>
+                </a:r>
+              </a:p>
+              <a:p>
+                <a:pPr lvl="1"/>
+                <a:r>
+                  <a:rPr lang="en-US" dirty="0"/>
+                  <a:t>Lasso: Since it provides sparse solutions, it is generally the model of choice for modelling cases where the features are in millions or more. </a:t>
+                </a:r>
+              </a:p>
+              <a:p>
+                <a:pPr marL="0" indent="0">
+                  <a:buNone/>
+                </a:pPr>
+                <a:endParaRPr lang="en-US" dirty="0"/>
+              </a:p>
+              <a:p>
+                <a:endParaRPr lang="en-US" dirty="0"/>
+              </a:p>
+            </p:txBody>
+          </p:sp>
+        </mc:Choice>
+        <mc:Fallback>
+          <p:sp>
+            <p:nvSpPr>
+              <p:cNvPr id="3" name="Content Placeholder 2"/>
+              <p:cNvSpPr>
+                <a:spLocks noGrp="1" noRot="1" noChangeAspect="1" noMove="1" noResize="1" noEditPoints="1" noAdjustHandles="1" noChangeArrowheads="1" noChangeShapeType="1" noTextEdit="1"/>
+              </p:cNvSpPr>
+              <p:nvPr>
+                <p:ph idx="1"/>
+              </p:nvPr>
+            </p:nvSpPr>
+            <p:spPr>
+              <a:blipFill>
+                <a:blip r:embed="rId3"/>
+                <a:stretch>
+                  <a:fillRect l="-1455" t="-1549" r="-303" b="-423"/>
+                </a:stretch>
+              </a:blipFill>
+            </p:spPr>
+            <p:txBody>
+              <a:bodyPr/>
+              <a:lstStyle/>
+              <a:p>
+                <a:r>
+                  <a:rPr lang="en-US">
+                    <a:noFill/>
+                  </a:rPr>
+                  <a:t> </a:t>
+                </a:r>
+              </a:p>
+            </p:txBody>
+          </p:sp>
+        </mc:Fallback>
+      </mc:AlternateContent>
+      <p:sp>
+        <p:nvSpPr>
+          <p:cNvPr id="4" name="Slide Number Placeholder 3"/>
+          <p:cNvSpPr>
+            <a:spLocks noGrp="1"/>
+          </p:cNvSpPr>
+          <p:nvPr>
+            <p:ph type="sldNum" sz="quarter" idx="12"/>
+          </p:nvPr>
+        </p:nvSpPr>
+        <p:spPr/>
+        <p:txBody>
+          <a:bodyPr/>
+          <a:lstStyle/>
+          <a:p>
+            <a:fld id="{629637A9-119A-49DA-BD12-AAC58B377D80}" type="slidenum">
+              <a:rPr lang="en-US" smtClean="0"/>
+              <a:t>47</a:t>
+            </a:fld>
+            <a:endParaRPr lang="en-US" dirty="0"/>
+          </a:p>
+        </p:txBody>
+      </p:sp>
+    </p:spTree>
+    <p:extLst>
+      <p:ext uri="{BB962C8B-B14F-4D97-AF65-F5344CB8AC3E}">
+        <p14:creationId xmlns:p14="http://schemas.microsoft.com/office/powerpoint/2010/main" val="3236947907"/>
+      </p:ext>
+    </p:extLst>
+  </p:cSld>
+  <p:clrMapOvr>
+    <a:masterClrMapping/>
+  </p:clrMapOvr>
+  <p:timing>
+    <p:tnLst>
+      <p:par>
+        <p:cTn id="1" dur="indefinite" restart="never" nodeType="tmRoot">
+          <p:childTnLst>
+            <p:seq concurrent="1" nextAc="seek">
+              <p:cTn id="2" dur="indefinite" nodeType="mainSeq">
+                <p:childTnLst>
+                  <p:par>
+                    <p:cTn id="3" fill="hold">
+                      <p:stCondLst>
+                        <p:cond delay="indefinite"/>
+                      </p:stCondLst>
+                      <p:childTnLst>
+                        <p:par>
+                          <p:cTn id="4" fill="hold">
+                            <p:stCondLst>
+                              <p:cond delay="0"/>
+                            </p:stCondLst>
+                            <p:childTnLst>
+                              <p:par>
+                                <p:cTn id="5" presetID="1" presetClass="entr" presetSubtype="0" fill="hold" nodeType="clickEffect">
+                                  <p:stCondLst>
+                                    <p:cond delay="0"/>
+                                  </p:stCondLst>
+                                  <p:childTnLst>
+                                    <p:set>
+                                      <p:cBhvr>
+                                        <p:cTn id="6" dur="1" fill="hold">
+                                          <p:stCondLst>
+                                            <p:cond delay="0"/>
+                                          </p:stCondLst>
+                                        </p:cTn>
+                                        <p:tgtEl>
+                                          <p:spTgt spid="3">
+                                            <p:txEl>
+                                              <p:pRg st="0" end="0"/>
+                                            </p:txEl>
+                                          </p:spTgt>
+                                        </p:tgtEl>
+                                        <p:attrNameLst>
+                                          <p:attrName>style.visibility</p:attrName>
+                                        </p:attrNameLst>
+                                      </p:cBhvr>
+                                      <p:to>
+                                        <p:strVal val="visible"/>
+                                      </p:to>
+                                    </p:set>
+                                  </p:childTnLst>
+                                </p:cTn>
+                              </p:par>
+                            </p:childTnLst>
+                          </p:cTn>
+                        </p:par>
+                      </p:childTnLst>
+                    </p:cTn>
+                  </p:par>
+                  <p:par>
+                    <p:cTn id="7" fill="hold">
+                      <p:stCondLst>
+                        <p:cond delay="indefinite"/>
+                      </p:stCondLst>
+                      <p:childTnLst>
+                        <p:par>
+                          <p:cTn id="8" fill="hold">
+                            <p:stCondLst>
+                              <p:cond delay="0"/>
+                            </p:stCondLst>
+                            <p:childTnLst>
+                              <p:par>
+                                <p:cTn id="9" presetID="1" presetClass="entr" presetSubtype="0" fill="hold" nodeType="clickEffect">
+                                  <p:stCondLst>
+                                    <p:cond delay="0"/>
+                                  </p:stCondLst>
+                                  <p:childTnLst>
+                                    <p:set>
+                                      <p:cBhvr>
+                                        <p:cTn id="10" dur="1" fill="hold">
+                                          <p:stCondLst>
+                                            <p:cond delay="0"/>
+                                          </p:stCondLst>
+                                        </p:cTn>
+                                        <p:tgtEl>
+                                          <p:spTgt spid="3">
+                                            <p:txEl>
+                                              <p:pRg st="1" end="1"/>
+                                            </p:txEl>
+                                          </p:spTgt>
+                                        </p:tgtEl>
+                                        <p:attrNameLst>
+                                          <p:attrName>style.visibility</p:attrName>
+                                        </p:attrNameLst>
+                                      </p:cBhvr>
+                                      <p:to>
+                                        <p:strVal val="visible"/>
+                                      </p:to>
+                                    </p:set>
+                                  </p:childTnLst>
+                                </p:cTn>
+                              </p:par>
+                            </p:childTnLst>
+                          </p:cTn>
+                        </p:par>
+                      </p:childTnLst>
+                    </p:cTn>
+                  </p:par>
+                </p:childTnLst>
+              </p:cTn>
+              <p:prevCondLst>
+                <p:cond evt="onPrev" delay="0">
+                  <p:tgtEl>
+                    <p:sldTgt/>
+                  </p:tgtEl>
+                </p:cond>
+              </p:prevCondLst>
+              <p:nextCondLst>
+                <p:cond evt="onNext" delay="0">
+                  <p:tgtEl>
+                    <p:sldTgt/>
+                  </p:tgtEl>
+                </p:cond>
+              </p:nextCondLst>
+            </p:seq>
+          </p:childTnLst>
+        </p:cTn>
+      </p:par>
+    </p:tnLst>
+  </p:timing>
+</p:sld>
+</file>
+
+<file path=ppt/slides/slide48.xml><?xml version="1.0" encoding="utf-8"?>
+<p:sld xmlns:a="http://schemas.openxmlformats.org/drawingml/2006/main" xmlns:r="http://schemas.openxmlformats.org/officeDocument/2006/relationships" xmlns:p="http://schemas.openxmlformats.org/presentationml/2006/main">
+  <p:cSld>
+    <p:spTree>
+      <p:nvGrpSpPr>
+        <p:cNvPr id="1" name=""/>
+        <p:cNvGrpSpPr/>
+        <p:nvPr/>
+      </p:nvGrpSpPr>
+      <p:grpSpPr>
+        <a:xfrm>
+          <a:off x="0" y="0"/>
+          <a:ext cx="0" cy="0"/>
+          <a:chOff x="0" y="0"/>
+          <a:chExt cx="0" cy="0"/>
+        </a:xfrm>
+      </p:grpSpPr>
+      <p:sp>
+        <p:nvSpPr>
+          <p:cNvPr id="2" name="Title 1">
+            <a:extLst>
+              <a:ext uri="{FF2B5EF4-FFF2-40B4-BE49-F238E27FC236}">
+                <a16:creationId xmlns:a16="http://schemas.microsoft.com/office/drawing/2014/main" id="{DF8E9DAA-64D2-4BC8-9C2C-9BC868898887}"/>
+              </a:ext>
+            </a:extLst>
+          </p:cNvPr>
+          <p:cNvSpPr>
+            <a:spLocks noGrp="1"/>
+          </p:cNvSpPr>
+          <p:nvPr>
+            <p:ph type="title"/>
+          </p:nvPr>
+        </p:nvSpPr>
+        <p:spPr/>
+        <p:txBody>
+          <a:bodyPr/>
+          <a:lstStyle/>
+          <a:p>
+            <a:endParaRPr lang="en-US"/>
+          </a:p>
+        </p:txBody>
+      </p:sp>
+      <p:sp>
+        <p:nvSpPr>
+          <p:cNvPr id="3" name="Content Placeholder 2">
+            <a:extLst>
+              <a:ext uri="{FF2B5EF4-FFF2-40B4-BE49-F238E27FC236}">
+                <a16:creationId xmlns:a16="http://schemas.microsoft.com/office/drawing/2014/main" id="{DECC5763-A7D2-4AD9-9D75-673E4CDF3D5D}"/>
+              </a:ext>
+            </a:extLst>
+          </p:cNvPr>
+          <p:cNvSpPr>
+            <a:spLocks noGrp="1"/>
+          </p:cNvSpPr>
+          <p:nvPr>
+            <p:ph idx="1"/>
+          </p:nvPr>
+        </p:nvSpPr>
+        <p:spPr/>
+        <p:txBody>
+          <a:bodyPr/>
+          <a:lstStyle/>
+          <a:p>
+            <a:pPr lvl="1"/>
+            <a:endParaRPr lang="en-US" dirty="0"/>
+          </a:p>
+          <a:p>
+            <a:pPr lvl="1"/>
+            <a:endParaRPr lang="en-US" dirty="0"/>
+          </a:p>
+        </p:txBody>
+      </p:sp>
+      <p:sp>
+        <p:nvSpPr>
+          <p:cNvPr id="4" name="Slide Number Placeholder 3">
+            <a:extLst>
+              <a:ext uri="{FF2B5EF4-FFF2-40B4-BE49-F238E27FC236}">
+                <a16:creationId xmlns:a16="http://schemas.microsoft.com/office/drawing/2014/main" id="{4F393725-A2F9-407C-9BE6-75CEBD1A6483}"/>
+              </a:ext>
+            </a:extLst>
+          </p:cNvPr>
+          <p:cNvSpPr>
+            <a:spLocks noGrp="1"/>
+          </p:cNvSpPr>
+          <p:nvPr>
+            <p:ph type="sldNum" sz="quarter" idx="12"/>
+          </p:nvPr>
+        </p:nvSpPr>
+        <p:spPr/>
+        <p:txBody>
+          <a:bodyPr/>
+          <a:lstStyle/>
+          <a:p>
+            <a:fld id="{629637A9-119A-49DA-BD12-AAC58B377D80}" type="slidenum">
+              <a:rPr lang="en-US" smtClean="0"/>
+              <a:t>48</a:t>
+            </a:fld>
+            <a:endParaRPr lang="en-US" dirty="0"/>
+          </a:p>
+        </p:txBody>
+      </p:sp>
+    </p:spTree>
+    <p:extLst>
+      <p:ext uri="{BB962C8B-B14F-4D97-AF65-F5344CB8AC3E}">
+        <p14:creationId xmlns:p14="http://schemas.microsoft.com/office/powerpoint/2010/main" val="3195049060"/>
+      </p:ext>
+    </p:extLst>
+  </p:cSld>
+  <p:clrMapOvr>
+    <a:masterClrMapping/>
+  </p:clrMapOvr>
+</p:sld>
+</file>
+
 <file path=ppt/slides/slide5.xml><?xml version="1.0" encoding="utf-8"?>
 <p:sld xmlns:a="http://schemas.openxmlformats.org/drawingml/2006/main" xmlns:r="http://schemas.openxmlformats.org/officeDocument/2006/relationships" xmlns:p="http://schemas.openxmlformats.org/presentationml/2006/main">
   <p:cSld>
@@ -29987,8 +30591,8 @@
           </a:p>
         </p:txBody>
       </p:sp>
-      <mc:AlternateContent xmlns:mc="http://schemas.openxmlformats.org/markup-compatibility/2006">
-        <mc:Choice xmlns:a14="http://schemas.microsoft.com/office/drawing/2010/main" Requires="a14">
+      <mc:AlternateContent xmlns:mc="http://schemas.openxmlformats.org/markup-compatibility/2006" xmlns:a14="http://schemas.microsoft.com/office/drawing/2010/main">
+        <mc:Choice Requires="a14">
           <p:sp>
             <p:nvSpPr>
               <p:cNvPr id="3" name="Content Placeholder 2">
@@ -30314,7 +30918,7 @@
             </p:txBody>
           </p:sp>
         </mc:Choice>
-        <mc:Fallback>
+        <mc:Fallback xmlns="">
           <p:sp>
             <p:nvSpPr>
               <p:cNvPr id="3" name="Content Placeholder 2">

</xml_diff>